<commit_message>
Slide changes - mostly additions and removing highlights
</commit_message>
<xml_diff>
--- a/modules/house_of_spirit/house_of_spirit.pptx
+++ b/modules/house_of_spirit/house_of_spirit.pptx
@@ -31835,7 +31835,7 @@
           <a:p>
             <a:fld id="{2DA23E8D-1792-1541-9147-970A8DD8A355}" type="datetimeFigureOut">
               <a:rPr lang="en-US" smtClean="0"/>
-              <a:t>5/12/21</a:t>
+              <a:t>9/27/21</a:t>
             </a:fld>
             <a:endParaRPr lang="en-US" dirty="0"/>
           </a:p>
@@ -32389,7 +32389,7 @@
                 <a:latin typeface="Calibri"/>
               </a:rPr>
               <a:pPr/>
-              <a:t>5/12/21</a:t>
+              <a:t>9/27/21</a:t>
             </a:fld>
             <a:endParaRPr lang="en-US" dirty="0">
               <a:solidFill>
@@ -32642,7 +32642,7 @@
                 <a:latin typeface="Calibri"/>
               </a:rPr>
               <a:pPr/>
-              <a:t>5/12/21</a:t>
+              <a:t>9/27/21</a:t>
             </a:fld>
             <a:endParaRPr lang="en-US" dirty="0">
               <a:solidFill>
@@ -32857,7 +32857,7 @@
                 <a:latin typeface="Calibri"/>
               </a:rPr>
               <a:pPr/>
-              <a:t>5/12/21</a:t>
+              <a:t>9/27/21</a:t>
             </a:fld>
             <a:endParaRPr lang="en-US" dirty="0">
               <a:solidFill>
@@ -33255,7 +33255,7 @@
                 <a:latin typeface="Calibri"/>
               </a:rPr>
               <a:pPr/>
-              <a:t>5/12/21</a:t>
+              <a:t>9/27/21</a:t>
             </a:fld>
             <a:endParaRPr lang="en-US" dirty="0">
               <a:solidFill>
@@ -33597,7 +33597,7 @@
                 <a:latin typeface="Calibri"/>
               </a:rPr>
               <a:pPr/>
-              <a:t>5/12/21</a:t>
+              <a:t>9/27/21</a:t>
             </a:fld>
             <a:endParaRPr lang="en-US" dirty="0">
               <a:solidFill>
@@ -33925,7 +33925,7 @@
                 <a:latin typeface="Calibri"/>
               </a:rPr>
               <a:pPr/>
-              <a:t>5/12/21</a:t>
+              <a:t>9/27/21</a:t>
             </a:fld>
             <a:endParaRPr lang="en-US" dirty="0">
               <a:solidFill>
@@ -34414,7 +34414,7 @@
                 <a:latin typeface="Calibri"/>
               </a:rPr>
               <a:pPr/>
-              <a:t>5/12/21</a:t>
+              <a:t>9/27/21</a:t>
             </a:fld>
             <a:endParaRPr lang="en-US" dirty="0">
               <a:solidFill>
@@ -34597,7 +34597,7 @@
                 <a:latin typeface="Calibri"/>
               </a:rPr>
               <a:pPr/>
-              <a:t>5/12/21</a:t>
+              <a:t>9/27/21</a:t>
             </a:fld>
             <a:endParaRPr lang="en-US" dirty="0">
               <a:solidFill>
@@ -34843,7 +34843,7 @@
                 <a:latin typeface="Calibri"/>
               </a:rPr>
               <a:pPr/>
-              <a:t>5/12/21</a:t>
+              <a:t>9/27/21</a:t>
             </a:fld>
             <a:endParaRPr lang="en-US" dirty="0">
               <a:solidFill>
@@ -35185,7 +35185,7 @@
                 <a:latin typeface="Calibri"/>
               </a:rPr>
               <a:pPr/>
-              <a:t>5/12/21</a:t>
+              <a:t>9/27/21</a:t>
             </a:fld>
             <a:endParaRPr lang="en-US" dirty="0">
               <a:solidFill>
@@ -35477,7 +35477,7 @@
                 <a:latin typeface="Calibri"/>
               </a:rPr>
               <a:pPr/>
-              <a:t>5/12/21</a:t>
+              <a:t>9/27/21</a:t>
             </a:fld>
             <a:endParaRPr lang="en-US" dirty="0">
               <a:solidFill>
@@ -35727,7 +35727,7 @@
                 <a:latin typeface="Calibri"/>
               </a:rPr>
               <a:pPr defTabSz="914400"/>
-              <a:t>5/12/21</a:t>
+              <a:t>9/27/21</a:t>
             </a:fld>
             <a:endParaRPr lang="en-US" dirty="0">
               <a:solidFill>
@@ -38150,7 +38150,7 @@
             </a:r>
             <a:r>
               <a:rPr lang="en-US" dirty="0"/>
-              <a:t>/challenge1</a:t>
+              <a:t>/exercise1</a:t>
             </a:r>
           </a:p>
           <a:p>

</xml_diff>

<commit_message>
Slide changes from CanSecWest
</commit_message>
<xml_diff>
--- a/modules/house_of_spirit/house_of_spirit.pptx
+++ b/modules/house_of_spirit/house_of_spirit.pptx
@@ -31835,7 +31835,7 @@
           <a:p>
             <a:fld id="{2DA23E8D-1792-1541-9147-970A8DD8A355}" type="datetimeFigureOut">
               <a:rPr lang="en-US" smtClean="0"/>
-              <a:t>9/27/21</a:t>
+              <a:t>5/10/22</a:t>
             </a:fld>
             <a:endParaRPr lang="en-US" dirty="0"/>
           </a:p>
@@ -32389,7 +32389,7 @@
                 <a:latin typeface="Calibri"/>
               </a:rPr>
               <a:pPr/>
-              <a:t>9/27/21</a:t>
+              <a:t>5/10/22</a:t>
             </a:fld>
             <a:endParaRPr lang="en-US" dirty="0">
               <a:solidFill>
@@ -32642,7 +32642,7 @@
                 <a:latin typeface="Calibri"/>
               </a:rPr>
               <a:pPr/>
-              <a:t>9/27/21</a:t>
+              <a:t>5/10/22</a:t>
             </a:fld>
             <a:endParaRPr lang="en-US" dirty="0">
               <a:solidFill>
@@ -32857,7 +32857,7 @@
                 <a:latin typeface="Calibri"/>
               </a:rPr>
               <a:pPr/>
-              <a:t>9/27/21</a:t>
+              <a:t>5/10/22</a:t>
             </a:fld>
             <a:endParaRPr lang="en-US" dirty="0">
               <a:solidFill>
@@ -33255,7 +33255,7 @@
                 <a:latin typeface="Calibri"/>
               </a:rPr>
               <a:pPr/>
-              <a:t>9/27/21</a:t>
+              <a:t>5/10/22</a:t>
             </a:fld>
             <a:endParaRPr lang="en-US" dirty="0">
               <a:solidFill>
@@ -33597,7 +33597,7 @@
                 <a:latin typeface="Calibri"/>
               </a:rPr>
               <a:pPr/>
-              <a:t>9/27/21</a:t>
+              <a:t>5/10/22</a:t>
             </a:fld>
             <a:endParaRPr lang="en-US" dirty="0">
               <a:solidFill>
@@ -33925,7 +33925,7 @@
                 <a:latin typeface="Calibri"/>
               </a:rPr>
               <a:pPr/>
-              <a:t>9/27/21</a:t>
+              <a:t>5/10/22</a:t>
             </a:fld>
             <a:endParaRPr lang="en-US" dirty="0">
               <a:solidFill>
@@ -34414,7 +34414,7 @@
                 <a:latin typeface="Calibri"/>
               </a:rPr>
               <a:pPr/>
-              <a:t>9/27/21</a:t>
+              <a:t>5/10/22</a:t>
             </a:fld>
             <a:endParaRPr lang="en-US" dirty="0">
               <a:solidFill>
@@ -34597,7 +34597,7 @@
                 <a:latin typeface="Calibri"/>
               </a:rPr>
               <a:pPr/>
-              <a:t>9/27/21</a:t>
+              <a:t>5/10/22</a:t>
             </a:fld>
             <a:endParaRPr lang="en-US" dirty="0">
               <a:solidFill>
@@ -34843,7 +34843,7 @@
                 <a:latin typeface="Calibri"/>
               </a:rPr>
               <a:pPr/>
-              <a:t>9/27/21</a:t>
+              <a:t>5/10/22</a:t>
             </a:fld>
             <a:endParaRPr lang="en-US" dirty="0">
               <a:solidFill>
@@ -35185,7 +35185,7 @@
                 <a:latin typeface="Calibri"/>
               </a:rPr>
               <a:pPr/>
-              <a:t>9/27/21</a:t>
+              <a:t>5/10/22</a:t>
             </a:fld>
             <a:endParaRPr lang="en-US" dirty="0">
               <a:solidFill>
@@ -35477,7 +35477,7 @@
                 <a:latin typeface="Calibri"/>
               </a:rPr>
               <a:pPr/>
-              <a:t>9/27/21</a:t>
+              <a:t>5/10/22</a:t>
             </a:fld>
             <a:endParaRPr lang="en-US" dirty="0">
               <a:solidFill>
@@ -35727,7 +35727,7 @@
                 <a:latin typeface="Calibri"/>
               </a:rPr>
               <a:pPr defTabSz="914400"/>
-              <a:t>9/27/21</a:t>
+              <a:t>5/10/22</a:t>
             </a:fld>
             <a:endParaRPr lang="en-US" dirty="0">
               <a:solidFill>
@@ -38116,7 +38116,7 @@
           <a:p>
             <a:r>
               <a:rPr lang="en-US" dirty="0"/>
-              <a:t>House of Spirit Challenge</a:t>
+              <a:t>House of Spirit Exercise</a:t>
             </a:r>
           </a:p>
         </p:txBody>

</xml_diff>